<commit_message>
Quelle bei Einleitung hinzugefügt
</commit_message>
<xml_diff>
--- a/doc/Twitter-Präsentation_edit2.pptx
+++ b/doc/Twitter-Präsentation_edit2.pptx
@@ -2514,21 +2514,21 @@
     </dgm:pt>
   </dgm:ptLst>
   <dgm:cxnLst>
-    <dgm:cxn modelId="{50C609E4-FE98-47D7-8DC5-9C4D6F3F90E9}" type="presOf" srcId="{C2CF600A-6D85-46E9-83C5-E6D9E1C05986}" destId="{6A1E1A56-6127-41E7-A1F9-D4B680E84EC0}" srcOrd="0" destOrd="0" presId="urn:microsoft.com/office/officeart/2008/layout/HorizontalMultiLevelHierarchy"/>
+    <dgm:cxn modelId="{4F96FCF0-22C7-4C99-9945-204D43E7A40C}" type="presOf" srcId="{99EEE825-37C8-4684-B388-10C429529160}" destId="{7F8BE768-FB7F-4802-AD40-E598A9DEA20B}" srcOrd="0" destOrd="0" presId="urn:microsoft.com/office/officeart/2008/layout/HorizontalMultiLevelHierarchy"/>
     <dgm:cxn modelId="{7908A0E7-06A4-48FB-8D33-FF76DE775706}" type="presOf" srcId="{C2CF600A-6D85-46E9-83C5-E6D9E1C05986}" destId="{546627A1-5DC5-4F10-B4C8-BAA2435F7372}" srcOrd="1" destOrd="0" presId="urn:microsoft.com/office/officeart/2008/layout/HorizontalMultiLevelHierarchy"/>
-    <dgm:cxn modelId="{0D7C86A8-BABB-4C23-A83B-7F9C2146C787}" srcId="{3DD8E27C-A0DF-435D-9446-B5C7E6C02BCE}" destId="{99EEE825-37C8-4684-B388-10C429529160}" srcOrd="2" destOrd="0" parTransId="{7808B1C8-2500-4F67-90C7-C8B67FAA0F50}" sibTransId="{4E94D91D-B488-44F9-AB6B-AF9D4AD5C41E}"/>
+    <dgm:cxn modelId="{4F1B2B66-56A5-46B8-8CD6-EE4FCB441115}" type="presOf" srcId="{AD541291-5A88-47E0-88E7-96FA1F960EDE}" destId="{6624A64B-82FE-4FA6-A06B-B800723F275E}" srcOrd="0" destOrd="0" presId="urn:microsoft.com/office/officeart/2008/layout/HorizontalMultiLevelHierarchy"/>
+    <dgm:cxn modelId="{514C917E-D6A2-4967-A318-AFC97C154965}" type="presOf" srcId="{80E4B82A-C085-4FD3-9EE5-05A20F97CCD8}" destId="{7372C349-811B-4306-B3DC-18EC7D22B450}" srcOrd="0" destOrd="0" presId="urn:microsoft.com/office/officeart/2008/layout/HorizontalMultiLevelHierarchy"/>
+    <dgm:cxn modelId="{F9668811-153A-4D31-9C84-6A62B800B3CE}" srcId="{3DD8E27C-A0DF-435D-9446-B5C7E6C02BCE}" destId="{34FF47C5-D614-4D3D-A5D1-4E72602066AE}" srcOrd="0" destOrd="0" parTransId="{7116ED11-9171-4C28-A652-790F8382E593}" sibTransId="{762670B5-60A3-4D4B-A90F-FEE283041221}"/>
     <dgm:cxn modelId="{DDAB0F07-09C1-4BD8-8321-9C365ADEC782}" type="presOf" srcId="{3DD8E27C-A0DF-435D-9446-B5C7E6C02BCE}" destId="{BDA28ADE-C795-4B20-8EA5-7D0B5A7FC950}" srcOrd="0" destOrd="0" presId="urn:microsoft.com/office/officeart/2008/layout/HorizontalMultiLevelHierarchy"/>
-    <dgm:cxn modelId="{539524AA-3502-4B7D-B83F-884548AB5060}" type="presOf" srcId="{7808B1C8-2500-4F67-90C7-C8B67FAA0F50}" destId="{6E806771-70C3-4406-B5E1-9BB04CFAE7F2}" srcOrd="1" destOrd="0" presId="urn:microsoft.com/office/officeart/2008/layout/HorizontalMultiLevelHierarchy"/>
-    <dgm:cxn modelId="{F9668811-153A-4D31-9C84-6A62B800B3CE}" srcId="{3DD8E27C-A0DF-435D-9446-B5C7E6C02BCE}" destId="{34FF47C5-D614-4D3D-A5D1-4E72602066AE}" srcOrd="0" destOrd="0" parTransId="{7116ED11-9171-4C28-A652-790F8382E593}" sibTransId="{762670B5-60A3-4D4B-A90F-FEE283041221}"/>
-    <dgm:cxn modelId="{589EC947-33AC-4EBC-B5AD-A16B30719BC8}" type="presOf" srcId="{7116ED11-9171-4C28-A652-790F8382E593}" destId="{EE3C12D2-9ABB-454D-A1A3-303973D074E0}" srcOrd="0" destOrd="0" presId="urn:microsoft.com/office/officeart/2008/layout/HorizontalMultiLevelHierarchy"/>
-    <dgm:cxn modelId="{4F1B2B66-56A5-46B8-8CD6-EE4FCB441115}" type="presOf" srcId="{AD541291-5A88-47E0-88E7-96FA1F960EDE}" destId="{6624A64B-82FE-4FA6-A06B-B800723F275E}" srcOrd="0" destOrd="0" presId="urn:microsoft.com/office/officeart/2008/layout/HorizontalMultiLevelHierarchy"/>
     <dgm:cxn modelId="{19B065E5-A4C2-47A5-B91B-6296D80AF288}" type="presOf" srcId="{7116ED11-9171-4C28-A652-790F8382E593}" destId="{6B770CFD-EBB2-425D-8770-0E3D487DE8EE}" srcOrd="1" destOrd="0" presId="urn:microsoft.com/office/officeart/2008/layout/HorizontalMultiLevelHierarchy"/>
     <dgm:cxn modelId="{1BC9B07D-CDD0-4BB4-A553-4A56E6A525F5}" type="presOf" srcId="{34FF47C5-D614-4D3D-A5D1-4E72602066AE}" destId="{0FD3CC52-A21F-415A-BD89-C28552CBDC3D}" srcOrd="0" destOrd="0" presId="urn:microsoft.com/office/officeart/2008/layout/HorizontalMultiLevelHierarchy"/>
-    <dgm:cxn modelId="{4F96FCF0-22C7-4C99-9945-204D43E7A40C}" type="presOf" srcId="{99EEE825-37C8-4684-B388-10C429529160}" destId="{7F8BE768-FB7F-4802-AD40-E598A9DEA20B}" srcOrd="0" destOrd="0" presId="urn:microsoft.com/office/officeart/2008/layout/HorizontalMultiLevelHierarchy"/>
+    <dgm:cxn modelId="{50C609E4-FE98-47D7-8DC5-9C4D6F3F90E9}" type="presOf" srcId="{C2CF600A-6D85-46E9-83C5-E6D9E1C05986}" destId="{6A1E1A56-6127-41E7-A1F9-D4B680E84EC0}" srcOrd="0" destOrd="0" presId="urn:microsoft.com/office/officeart/2008/layout/HorizontalMultiLevelHierarchy"/>
+    <dgm:cxn modelId="{D0474A84-BCE7-4F00-B358-43DB14F25E88}" srcId="{3DD8E27C-A0DF-435D-9446-B5C7E6C02BCE}" destId="{80E4B82A-C085-4FD3-9EE5-05A20F97CCD8}" srcOrd="1" destOrd="0" parTransId="{C2CF600A-6D85-46E9-83C5-E6D9E1C05986}" sibTransId="{F8B68735-1E91-458F-932A-037D4B8EDB51}"/>
+    <dgm:cxn modelId="{589EC947-33AC-4EBC-B5AD-A16B30719BC8}" type="presOf" srcId="{7116ED11-9171-4C28-A652-790F8382E593}" destId="{EE3C12D2-9ABB-454D-A1A3-303973D074E0}" srcOrd="0" destOrd="0" presId="urn:microsoft.com/office/officeart/2008/layout/HorizontalMultiLevelHierarchy"/>
+    <dgm:cxn modelId="{539524AA-3502-4B7D-B83F-884548AB5060}" type="presOf" srcId="{7808B1C8-2500-4F67-90C7-C8B67FAA0F50}" destId="{6E806771-70C3-4406-B5E1-9BB04CFAE7F2}" srcOrd="1" destOrd="0" presId="urn:microsoft.com/office/officeart/2008/layout/HorizontalMultiLevelHierarchy"/>
+    <dgm:cxn modelId="{FBA7E2BC-FF44-42CE-89DB-120AA7CA4A02}" srcId="{AD541291-5A88-47E0-88E7-96FA1F960EDE}" destId="{3DD8E27C-A0DF-435D-9446-B5C7E6C02BCE}" srcOrd="0" destOrd="0" parTransId="{3E2D2320-CD5B-4F9E-A0B1-BE354A45E173}" sibTransId="{2578260C-345E-4C5A-927A-6532536E3D7F}"/>
     <dgm:cxn modelId="{445BA23E-8E24-40E9-8B46-30295DE19B3D}" type="presOf" srcId="{7808B1C8-2500-4F67-90C7-C8B67FAA0F50}" destId="{D128AAB6-79ED-4B97-BDDD-746E57760887}" srcOrd="0" destOrd="0" presId="urn:microsoft.com/office/officeart/2008/layout/HorizontalMultiLevelHierarchy"/>
-    <dgm:cxn modelId="{D0474A84-BCE7-4F00-B358-43DB14F25E88}" srcId="{3DD8E27C-A0DF-435D-9446-B5C7E6C02BCE}" destId="{80E4B82A-C085-4FD3-9EE5-05A20F97CCD8}" srcOrd="1" destOrd="0" parTransId="{C2CF600A-6D85-46E9-83C5-E6D9E1C05986}" sibTransId="{F8B68735-1E91-458F-932A-037D4B8EDB51}"/>
-    <dgm:cxn modelId="{514C917E-D6A2-4967-A318-AFC97C154965}" type="presOf" srcId="{80E4B82A-C085-4FD3-9EE5-05A20F97CCD8}" destId="{7372C349-811B-4306-B3DC-18EC7D22B450}" srcOrd="0" destOrd="0" presId="urn:microsoft.com/office/officeart/2008/layout/HorizontalMultiLevelHierarchy"/>
-    <dgm:cxn modelId="{FBA7E2BC-FF44-42CE-89DB-120AA7CA4A02}" srcId="{AD541291-5A88-47E0-88E7-96FA1F960EDE}" destId="{3DD8E27C-A0DF-435D-9446-B5C7E6C02BCE}" srcOrd="0" destOrd="0" parTransId="{3E2D2320-CD5B-4F9E-A0B1-BE354A45E173}" sibTransId="{2578260C-345E-4C5A-927A-6532536E3D7F}"/>
+    <dgm:cxn modelId="{0D7C86A8-BABB-4C23-A83B-7F9C2146C787}" srcId="{3DD8E27C-A0DF-435D-9446-B5C7E6C02BCE}" destId="{99EEE825-37C8-4684-B388-10C429529160}" srcOrd="2" destOrd="0" parTransId="{7808B1C8-2500-4F67-90C7-C8B67FAA0F50}" sibTransId="{4E94D91D-B488-44F9-AB6B-AF9D4AD5C41E}"/>
     <dgm:cxn modelId="{893EA24F-A2F0-4FD1-939D-B665B1B416B1}" type="presParOf" srcId="{6624A64B-82FE-4FA6-A06B-B800723F275E}" destId="{3EC2FF04-5032-4A2B-A0EF-EE912B78C924}" srcOrd="0" destOrd="0" presId="urn:microsoft.com/office/officeart/2008/layout/HorizontalMultiLevelHierarchy"/>
     <dgm:cxn modelId="{94A5DB7E-E1AF-48A6-B302-3D0D0198EFBC}" type="presParOf" srcId="{3EC2FF04-5032-4A2B-A0EF-EE912B78C924}" destId="{BDA28ADE-C795-4B20-8EA5-7D0B5A7FC950}" srcOrd="0" destOrd="0" presId="urn:microsoft.com/office/officeart/2008/layout/HorizontalMultiLevelHierarchy"/>
     <dgm:cxn modelId="{BE7015A4-C792-4139-A19B-1050968C32A8}" type="presParOf" srcId="{3EC2FF04-5032-4A2B-A0EF-EE912B78C924}" destId="{3CCC1A6A-A98B-42A8-910D-BA4A8C5BE2C3}" srcOrd="1" destOrd="0" presId="urn:microsoft.com/office/officeart/2008/layout/HorizontalMultiLevelHierarchy"/>
@@ -3401,563 +3401,6 @@
       <dsp:cNvGrpSpPr/>
     </dsp:nvGrpSpPr>
     <dsp:grpSpPr/>
-    <dsp:sp modelId="{D128AAB6-79ED-4B97-BDDD-746E57760887}">
-      <dsp:nvSpPr>
-        <dsp:cNvPr id="0" name=""/>
-        <dsp:cNvSpPr/>
-      </dsp:nvSpPr>
-      <dsp:spPr>
-        <a:xfrm>
-          <a:off x="2813192" y="2447131"/>
-          <a:ext cx="610020" cy="1550596"/>
-        </a:xfrm>
-        <a:custGeom>
-          <a:avLst/>
-          <a:gdLst/>
-          <a:ahLst/>
-          <a:cxnLst/>
-          <a:rect l="0" t="0" r="0" b="0"/>
-          <a:pathLst>
-            <a:path>
-              <a:moveTo>
-                <a:pt x="0" y="0"/>
-              </a:moveTo>
-              <a:lnTo>
-                <a:pt x="305010" y="0"/>
-              </a:lnTo>
-              <a:lnTo>
-                <a:pt x="305010" y="1550596"/>
-              </a:lnTo>
-              <a:lnTo>
-                <a:pt x="610020" y="1550596"/>
-              </a:lnTo>
-            </a:path>
-          </a:pathLst>
-        </a:custGeom>
-        <a:noFill/>
-        <a:ln w="25400" cap="flat" cmpd="sng" algn="ctr">
-          <a:solidFill>
-            <a:schemeClr val="accent1">
-              <a:shade val="60000"/>
-              <a:hueOff val="0"/>
-              <a:satOff val="0"/>
-              <a:lumOff val="0"/>
-              <a:alphaOff val="0"/>
-            </a:schemeClr>
-          </a:solidFill>
-          <a:prstDash val="solid"/>
-        </a:ln>
-        <a:effectLst/>
-      </dsp:spPr>
-      <dsp:style>
-        <a:lnRef idx="2">
-          <a:scrgbClr r="0" g="0" b="0"/>
-        </a:lnRef>
-        <a:fillRef idx="0">
-          <a:scrgbClr r="0" g="0" b="0"/>
-        </a:fillRef>
-        <a:effectRef idx="0">
-          <a:scrgbClr r="0" g="0" b="0"/>
-        </a:effectRef>
-        <a:fontRef idx="minor"/>
-      </dsp:style>
-      <dsp:txBody>
-        <a:bodyPr spcFirstLastPara="0" vert="horz" wrap="square" lIns="12700" tIns="0" rIns="12700" bIns="0" numCol="1" spcCol="1270" anchor="ctr" anchorCtr="0">
-          <a:noAutofit/>
-        </a:bodyPr>
-        <a:lstStyle/>
-        <a:p>
-          <a:pPr lvl="0" algn="ctr" defTabSz="266700">
-            <a:lnSpc>
-              <a:spcPct val="90000"/>
-            </a:lnSpc>
-            <a:spcBef>
-              <a:spcPct val="0"/>
-            </a:spcBef>
-            <a:spcAft>
-              <a:spcPct val="35000"/>
-            </a:spcAft>
-          </a:pPr>
-          <a:endParaRPr lang="de-DE" sz="600" kern="1200"/>
-        </a:p>
-      </dsp:txBody>
-      <dsp:txXfrm>
-        <a:off x="3076545" y="3180772"/>
-        <a:ext cx="83313" cy="83313"/>
-      </dsp:txXfrm>
-    </dsp:sp>
-    <dsp:sp modelId="{6A1E1A56-6127-41E7-A1F9-D4B680E84EC0}">
-      <dsp:nvSpPr>
-        <dsp:cNvPr id="0" name=""/>
-        <dsp:cNvSpPr/>
-      </dsp:nvSpPr>
-      <dsp:spPr>
-        <a:xfrm>
-          <a:off x="2813192" y="2401411"/>
-          <a:ext cx="610020" cy="91440"/>
-        </a:xfrm>
-        <a:custGeom>
-          <a:avLst/>
-          <a:gdLst/>
-          <a:ahLst/>
-          <a:cxnLst/>
-          <a:rect l="0" t="0" r="0" b="0"/>
-          <a:pathLst>
-            <a:path>
-              <a:moveTo>
-                <a:pt x="0" y="45720"/>
-              </a:moveTo>
-              <a:lnTo>
-                <a:pt x="610020" y="45720"/>
-              </a:lnTo>
-            </a:path>
-          </a:pathLst>
-        </a:custGeom>
-        <a:noFill/>
-        <a:ln w="25400" cap="flat" cmpd="sng" algn="ctr">
-          <a:solidFill>
-            <a:schemeClr val="accent1">
-              <a:shade val="60000"/>
-              <a:hueOff val="0"/>
-              <a:satOff val="0"/>
-              <a:lumOff val="0"/>
-              <a:alphaOff val="0"/>
-            </a:schemeClr>
-          </a:solidFill>
-          <a:prstDash val="solid"/>
-        </a:ln>
-        <a:effectLst/>
-      </dsp:spPr>
-      <dsp:style>
-        <a:lnRef idx="2">
-          <a:scrgbClr r="0" g="0" b="0"/>
-        </a:lnRef>
-        <a:fillRef idx="0">
-          <a:scrgbClr r="0" g="0" b="0"/>
-        </a:fillRef>
-        <a:effectRef idx="0">
-          <a:scrgbClr r="0" g="0" b="0"/>
-        </a:effectRef>
-        <a:fontRef idx="minor"/>
-      </dsp:style>
-      <dsp:txBody>
-        <a:bodyPr spcFirstLastPara="0" vert="horz" wrap="square" lIns="12700" tIns="0" rIns="12700" bIns="0" numCol="1" spcCol="1270" anchor="ctr" anchorCtr="0">
-          <a:noAutofit/>
-        </a:bodyPr>
-        <a:lstStyle/>
-        <a:p>
-          <a:pPr lvl="0" algn="ctr" defTabSz="222250">
-            <a:lnSpc>
-              <a:spcPct val="90000"/>
-            </a:lnSpc>
-            <a:spcBef>
-              <a:spcPct val="0"/>
-            </a:spcBef>
-            <a:spcAft>
-              <a:spcPct val="35000"/>
-            </a:spcAft>
-          </a:pPr>
-          <a:endParaRPr lang="de-DE" sz="500" kern="1200"/>
-        </a:p>
-      </dsp:txBody>
-      <dsp:txXfrm>
-        <a:off x="3102952" y="2431880"/>
-        <a:ext cx="30501" cy="30501"/>
-      </dsp:txXfrm>
-    </dsp:sp>
-    <dsp:sp modelId="{EE3C12D2-9ABB-454D-A1A3-303973D074E0}">
-      <dsp:nvSpPr>
-        <dsp:cNvPr id="0" name=""/>
-        <dsp:cNvSpPr/>
-      </dsp:nvSpPr>
-      <dsp:spPr>
-        <a:xfrm>
-          <a:off x="2813192" y="1039210"/>
-          <a:ext cx="610020" cy="1407920"/>
-        </a:xfrm>
-        <a:custGeom>
-          <a:avLst/>
-          <a:gdLst/>
-          <a:ahLst/>
-          <a:cxnLst/>
-          <a:rect l="0" t="0" r="0" b="0"/>
-          <a:pathLst>
-            <a:path>
-              <a:moveTo>
-                <a:pt x="0" y="1407920"/>
-              </a:moveTo>
-              <a:lnTo>
-                <a:pt x="305010" y="1407920"/>
-              </a:lnTo>
-              <a:lnTo>
-                <a:pt x="305010" y="0"/>
-              </a:lnTo>
-              <a:lnTo>
-                <a:pt x="610020" y="0"/>
-              </a:lnTo>
-            </a:path>
-          </a:pathLst>
-        </a:custGeom>
-        <a:noFill/>
-        <a:ln w="25400" cap="flat" cmpd="sng" algn="ctr">
-          <a:solidFill>
-            <a:schemeClr val="accent1">
-              <a:shade val="60000"/>
-              <a:hueOff val="0"/>
-              <a:satOff val="0"/>
-              <a:lumOff val="0"/>
-              <a:alphaOff val="0"/>
-            </a:schemeClr>
-          </a:solidFill>
-          <a:prstDash val="solid"/>
-        </a:ln>
-        <a:effectLst/>
-      </dsp:spPr>
-      <dsp:style>
-        <a:lnRef idx="2">
-          <a:scrgbClr r="0" g="0" b="0"/>
-        </a:lnRef>
-        <a:fillRef idx="0">
-          <a:scrgbClr r="0" g="0" b="0"/>
-        </a:fillRef>
-        <a:effectRef idx="0">
-          <a:scrgbClr r="0" g="0" b="0"/>
-        </a:effectRef>
-        <a:fontRef idx="minor"/>
-      </dsp:style>
-      <dsp:txBody>
-        <a:bodyPr spcFirstLastPara="0" vert="horz" wrap="square" lIns="12700" tIns="0" rIns="12700" bIns="0" numCol="1" spcCol="1270" anchor="ctr" anchorCtr="0">
-          <a:noAutofit/>
-        </a:bodyPr>
-        <a:lstStyle/>
-        <a:p>
-          <a:pPr lvl="0" algn="ctr" defTabSz="222250">
-            <a:lnSpc>
-              <a:spcPct val="90000"/>
-            </a:lnSpc>
-            <a:spcBef>
-              <a:spcPct val="0"/>
-            </a:spcBef>
-            <a:spcAft>
-              <a:spcPct val="35000"/>
-            </a:spcAft>
-          </a:pPr>
-          <a:endParaRPr lang="de-DE" sz="500" kern="1200"/>
-        </a:p>
-      </dsp:txBody>
-      <dsp:txXfrm>
-        <a:off x="3079842" y="1704810"/>
-        <a:ext cx="76719" cy="76719"/>
-      </dsp:txXfrm>
-    </dsp:sp>
-    <dsp:sp modelId="{BDA28ADE-C795-4B20-8EA5-7D0B5A7FC950}">
-      <dsp:nvSpPr>
-        <dsp:cNvPr id="0" name=""/>
-        <dsp:cNvSpPr/>
-      </dsp:nvSpPr>
-      <dsp:spPr>
-        <a:xfrm rot="16200000">
-          <a:off x="-98893" y="1982176"/>
-          <a:ext cx="4894262" cy="929909"/>
-        </a:xfrm>
-        <a:prstGeom prst="rect">
-          <a:avLst/>
-        </a:prstGeom>
-        <a:solidFill>
-          <a:schemeClr val="accent1">
-            <a:hueOff val="0"/>
-            <a:satOff val="0"/>
-            <a:lumOff val="0"/>
-            <a:alphaOff val="0"/>
-          </a:schemeClr>
-        </a:solidFill>
-        <a:ln w="25400" cap="flat" cmpd="sng" algn="ctr">
-          <a:solidFill>
-            <a:schemeClr val="lt1">
-              <a:hueOff val="0"/>
-              <a:satOff val="0"/>
-              <a:lumOff val="0"/>
-              <a:alphaOff val="0"/>
-            </a:schemeClr>
-          </a:solidFill>
-          <a:prstDash val="solid"/>
-        </a:ln>
-        <a:effectLst/>
-      </dsp:spPr>
-      <dsp:style>
-        <a:lnRef idx="2">
-          <a:scrgbClr r="0" g="0" b="0"/>
-        </a:lnRef>
-        <a:fillRef idx="1">
-          <a:scrgbClr r="0" g="0" b="0"/>
-        </a:fillRef>
-        <a:effectRef idx="0">
-          <a:scrgbClr r="0" g="0" b="0"/>
-        </a:effectRef>
-        <a:fontRef idx="minor">
-          <a:schemeClr val="lt1"/>
-        </a:fontRef>
-      </dsp:style>
-      <dsp:txBody>
-        <a:bodyPr spcFirstLastPara="0" vert="horz" wrap="square" lIns="40640" tIns="40640" rIns="40640" bIns="40640" numCol="1" spcCol="1270" anchor="ctr" anchorCtr="0">
-          <a:noAutofit/>
-        </a:bodyPr>
-        <a:lstStyle/>
-        <a:p>
-          <a:pPr lvl="0" algn="ctr" defTabSz="2844800">
-            <a:lnSpc>
-              <a:spcPct val="90000"/>
-            </a:lnSpc>
-            <a:spcBef>
-              <a:spcPct val="0"/>
-            </a:spcBef>
-            <a:spcAft>
-              <a:spcPct val="35000"/>
-            </a:spcAft>
-          </a:pPr>
-          <a:r>
-            <a:rPr lang="de-DE" sz="6400" kern="1200" dirty="0" smtClean="0"/>
-            <a:t>Datenbank</a:t>
-          </a:r>
-          <a:endParaRPr lang="de-DE" sz="6400" kern="1200" dirty="0"/>
-        </a:p>
-      </dsp:txBody>
-      <dsp:txXfrm>
-        <a:off x="-98893" y="1982176"/>
-        <a:ext cx="4894262" cy="929909"/>
-      </dsp:txXfrm>
-    </dsp:sp>
-    <dsp:sp modelId="{0FD3CC52-A21F-415A-BD89-C28552CBDC3D}">
-      <dsp:nvSpPr>
-        <dsp:cNvPr id="0" name=""/>
-        <dsp:cNvSpPr/>
-      </dsp:nvSpPr>
-      <dsp:spPr>
-        <a:xfrm>
-          <a:off x="3423213" y="574255"/>
-          <a:ext cx="3050104" cy="929909"/>
-        </a:xfrm>
-        <a:prstGeom prst="rect">
-          <a:avLst/>
-        </a:prstGeom>
-        <a:solidFill>
-          <a:schemeClr val="accent1">
-            <a:hueOff val="0"/>
-            <a:satOff val="0"/>
-            <a:lumOff val="0"/>
-            <a:alphaOff val="0"/>
-          </a:schemeClr>
-        </a:solidFill>
-        <a:ln w="25400" cap="flat" cmpd="sng" algn="ctr">
-          <a:solidFill>
-            <a:schemeClr val="lt1">
-              <a:hueOff val="0"/>
-              <a:satOff val="0"/>
-              <a:lumOff val="0"/>
-              <a:alphaOff val="0"/>
-            </a:schemeClr>
-          </a:solidFill>
-          <a:prstDash val="solid"/>
-        </a:ln>
-        <a:effectLst/>
-      </dsp:spPr>
-      <dsp:style>
-        <a:lnRef idx="2">
-          <a:scrgbClr r="0" g="0" b="0"/>
-        </a:lnRef>
-        <a:fillRef idx="1">
-          <a:scrgbClr r="0" g="0" b="0"/>
-        </a:fillRef>
-        <a:effectRef idx="0">
-          <a:scrgbClr r="0" g="0" b="0"/>
-        </a:effectRef>
-        <a:fontRef idx="minor">
-          <a:schemeClr val="lt1"/>
-        </a:fontRef>
-      </dsp:style>
-      <dsp:txBody>
-        <a:bodyPr spcFirstLastPara="0" vert="horz" wrap="square" lIns="23495" tIns="23495" rIns="23495" bIns="23495" numCol="1" spcCol="1270" anchor="ctr" anchorCtr="0">
-          <a:noAutofit/>
-        </a:bodyPr>
-        <a:lstStyle/>
-        <a:p>
-          <a:pPr lvl="0" algn="ctr" defTabSz="1644650">
-            <a:lnSpc>
-              <a:spcPct val="90000"/>
-            </a:lnSpc>
-            <a:spcBef>
-              <a:spcPct val="0"/>
-            </a:spcBef>
-            <a:spcAft>
-              <a:spcPct val="35000"/>
-            </a:spcAft>
-          </a:pPr>
-          <a:r>
-            <a:rPr lang="de-DE" sz="3700" kern="1200" dirty="0" smtClean="0"/>
-            <a:t>Crawler</a:t>
-          </a:r>
-          <a:endParaRPr lang="de-DE" sz="3700" kern="1200" dirty="0"/>
-        </a:p>
-      </dsp:txBody>
-      <dsp:txXfrm>
-        <a:off x="3423213" y="574255"/>
-        <a:ext cx="3050104" cy="929909"/>
-      </dsp:txXfrm>
-    </dsp:sp>
-    <dsp:sp modelId="{7372C349-811B-4306-B3DC-18EC7D22B450}">
-      <dsp:nvSpPr>
-        <dsp:cNvPr id="0" name=""/>
-        <dsp:cNvSpPr/>
-      </dsp:nvSpPr>
-      <dsp:spPr>
-        <a:xfrm>
-          <a:off x="3423213" y="1982176"/>
-          <a:ext cx="3050104" cy="929909"/>
-        </a:xfrm>
-        <a:prstGeom prst="rect">
-          <a:avLst/>
-        </a:prstGeom>
-        <a:solidFill>
-          <a:schemeClr val="accent1">
-            <a:hueOff val="0"/>
-            <a:satOff val="0"/>
-            <a:lumOff val="0"/>
-            <a:alphaOff val="0"/>
-          </a:schemeClr>
-        </a:solidFill>
-        <a:ln w="25400" cap="flat" cmpd="sng" algn="ctr">
-          <a:solidFill>
-            <a:schemeClr val="lt1">
-              <a:hueOff val="0"/>
-              <a:satOff val="0"/>
-              <a:lumOff val="0"/>
-              <a:alphaOff val="0"/>
-            </a:schemeClr>
-          </a:solidFill>
-          <a:prstDash val="solid"/>
-        </a:ln>
-        <a:effectLst/>
-      </dsp:spPr>
-      <dsp:style>
-        <a:lnRef idx="2">
-          <a:scrgbClr r="0" g="0" b="0"/>
-        </a:lnRef>
-        <a:fillRef idx="1">
-          <a:scrgbClr r="0" g="0" b="0"/>
-        </a:fillRef>
-        <a:effectRef idx="0">
-          <a:scrgbClr r="0" g="0" b="0"/>
-        </a:effectRef>
-        <a:fontRef idx="minor">
-          <a:schemeClr val="lt1"/>
-        </a:fontRef>
-      </dsp:style>
-      <dsp:txBody>
-        <a:bodyPr spcFirstLastPara="0" vert="horz" wrap="square" lIns="23495" tIns="23495" rIns="23495" bIns="23495" numCol="1" spcCol="1270" anchor="ctr" anchorCtr="0">
-          <a:noAutofit/>
-        </a:bodyPr>
-        <a:lstStyle/>
-        <a:p>
-          <a:pPr lvl="0" algn="ctr" defTabSz="1644650">
-            <a:lnSpc>
-              <a:spcPct val="90000"/>
-            </a:lnSpc>
-            <a:spcBef>
-              <a:spcPct val="0"/>
-            </a:spcBef>
-            <a:spcAft>
-              <a:spcPct val="35000"/>
-            </a:spcAft>
-          </a:pPr>
-          <a:r>
-            <a:rPr lang="de-DE" sz="3700" kern="1200" dirty="0" err="1" smtClean="0"/>
-            <a:t>Kategorisierer</a:t>
-          </a:r>
-          <a:endParaRPr lang="de-DE" sz="3700" kern="1200" dirty="0"/>
-        </a:p>
-      </dsp:txBody>
-      <dsp:txXfrm>
-        <a:off x="3423213" y="1982176"/>
-        <a:ext cx="3050104" cy="929909"/>
-      </dsp:txXfrm>
-    </dsp:sp>
-    <dsp:sp modelId="{7F8BE768-FB7F-4802-AD40-E598A9DEA20B}">
-      <dsp:nvSpPr>
-        <dsp:cNvPr id="0" name=""/>
-        <dsp:cNvSpPr/>
-      </dsp:nvSpPr>
-      <dsp:spPr>
-        <a:xfrm>
-          <a:off x="3423213" y="3532772"/>
-          <a:ext cx="3050104" cy="929909"/>
-        </a:xfrm>
-        <a:prstGeom prst="rect">
-          <a:avLst/>
-        </a:prstGeom>
-        <a:solidFill>
-          <a:schemeClr val="accent1">
-            <a:hueOff val="0"/>
-            <a:satOff val="0"/>
-            <a:lumOff val="0"/>
-            <a:alphaOff val="0"/>
-          </a:schemeClr>
-        </a:solidFill>
-        <a:ln w="25400" cap="flat" cmpd="sng" algn="ctr">
-          <a:solidFill>
-            <a:schemeClr val="lt1">
-              <a:hueOff val="0"/>
-              <a:satOff val="0"/>
-              <a:lumOff val="0"/>
-              <a:alphaOff val="0"/>
-            </a:schemeClr>
-          </a:solidFill>
-          <a:prstDash val="solid"/>
-        </a:ln>
-        <a:effectLst/>
-      </dsp:spPr>
-      <dsp:style>
-        <a:lnRef idx="2">
-          <a:scrgbClr r="0" g="0" b="0"/>
-        </a:lnRef>
-        <a:fillRef idx="1">
-          <a:scrgbClr r="0" g="0" b="0"/>
-        </a:fillRef>
-        <a:effectRef idx="0">
-          <a:scrgbClr r="0" g="0" b="0"/>
-        </a:effectRef>
-        <a:fontRef idx="minor">
-          <a:schemeClr val="lt1"/>
-        </a:fontRef>
-      </dsp:style>
-      <dsp:txBody>
-        <a:bodyPr spcFirstLastPara="0" vert="horz" wrap="square" lIns="23495" tIns="23495" rIns="23495" bIns="23495" numCol="1" spcCol="1270" anchor="ctr" anchorCtr="0">
-          <a:noAutofit/>
-        </a:bodyPr>
-        <a:lstStyle/>
-        <a:p>
-          <a:pPr lvl="0" algn="ctr" defTabSz="1644650">
-            <a:lnSpc>
-              <a:spcPct val="90000"/>
-            </a:lnSpc>
-            <a:spcBef>
-              <a:spcPct val="0"/>
-            </a:spcBef>
-            <a:spcAft>
-              <a:spcPct val="35000"/>
-            </a:spcAft>
-          </a:pPr>
-          <a:r>
-            <a:rPr lang="de-DE" sz="3700" kern="1200" dirty="0" smtClean="0"/>
-            <a:t>GUI</a:t>
-          </a:r>
-          <a:endParaRPr lang="de-DE" sz="3700" kern="1200" dirty="0"/>
-        </a:p>
-      </dsp:txBody>
-      <dsp:txXfrm>
-        <a:off x="3423213" y="3532772"/>
-        <a:ext cx="3050104" cy="929909"/>
-      </dsp:txXfrm>
-    </dsp:sp>
   </dsp:spTree>
 </dsp:drawing>
 </file>
@@ -7354,6 +6797,118 @@
               <a:pPr>
                 <a:defRPr/>
               </a:pPr>
+              <a:t>3</a:t>
+            </a:fld>
+            <a:endParaRPr lang="de-DE"/>
+          </a:p>
+        </p:txBody>
+      </p:sp>
+    </p:spTree>
+    <p:extLst>
+      <p:ext uri="{BB962C8B-B14F-4D97-AF65-F5344CB8AC3E}">
+        <p14:creationId xmlns:p14="http://schemas.microsoft.com/office/powerpoint/2010/main" val="1692958226"/>
+      </p:ext>
+    </p:extLst>
+  </p:cSld>
+  <p:clrMapOvr>
+    <a:masterClrMapping/>
+  </p:clrMapOvr>
+</p:notes>
+</file>
+
+<file path=ppt/notesSlides/notesSlide3.xml><?xml version="1.0" encoding="utf-8"?>
+<p:notes xmlns:a="http://schemas.openxmlformats.org/drawingml/2006/main" xmlns:r="http://schemas.openxmlformats.org/officeDocument/2006/relationships" xmlns:p="http://schemas.openxmlformats.org/presentationml/2006/main">
+  <p:cSld>
+    <p:spTree>
+      <p:nvGrpSpPr>
+        <p:cNvPr id="1" name=""/>
+        <p:cNvGrpSpPr/>
+        <p:nvPr/>
+      </p:nvGrpSpPr>
+      <p:grpSpPr>
+        <a:xfrm>
+          <a:off x="0" y="0"/>
+          <a:ext cx="0" cy="0"/>
+          <a:chOff x="0" y="0"/>
+          <a:chExt cx="0" cy="0"/>
+        </a:xfrm>
+      </p:grpSpPr>
+      <p:sp>
+        <p:nvSpPr>
+          <p:cNvPr id="2" name="Folienbildplatzhalter 1"/>
+          <p:cNvSpPr>
+            <a:spLocks noGrp="1" noRot="1" noChangeAspect="1"/>
+          </p:cNvSpPr>
+          <p:nvPr>
+            <p:ph type="sldImg"/>
+          </p:nvPr>
+        </p:nvSpPr>
+        <p:spPr/>
+      </p:sp>
+      <p:sp>
+        <p:nvSpPr>
+          <p:cNvPr id="3" name="Notizenplatzhalter 2"/>
+          <p:cNvSpPr>
+            <a:spLocks noGrp="1"/>
+          </p:cNvSpPr>
+          <p:nvPr>
+            <p:ph type="body" idx="1"/>
+          </p:nvPr>
+        </p:nvSpPr>
+        <p:spPr/>
+        <p:txBody>
+          <a:bodyPr/>
+          <a:lstStyle/>
+          <a:p>
+            <a:endParaRPr lang="de-DE"/>
+          </a:p>
+        </p:txBody>
+      </p:sp>
+      <p:sp>
+        <p:nvSpPr>
+          <p:cNvPr id="4" name="Fußzeilenplatzhalter 3"/>
+          <p:cNvSpPr>
+            <a:spLocks noGrp="1"/>
+          </p:cNvSpPr>
+          <p:nvPr>
+            <p:ph type="ftr" sz="quarter" idx="10"/>
+          </p:nvPr>
+        </p:nvSpPr>
+        <p:spPr/>
+        <p:txBody>
+          <a:bodyPr/>
+          <a:lstStyle/>
+          <a:p>
+            <a:pPr>
+              <a:defRPr/>
+            </a:pPr>
+            <a:endParaRPr lang="de-DE"/>
+          </a:p>
+        </p:txBody>
+      </p:sp>
+      <p:sp>
+        <p:nvSpPr>
+          <p:cNvPr id="5" name="Foliennummernplatzhalter 4"/>
+          <p:cNvSpPr>
+            <a:spLocks noGrp="1"/>
+          </p:cNvSpPr>
+          <p:nvPr>
+            <p:ph type="sldNum" sz="quarter" idx="11"/>
+          </p:nvPr>
+        </p:nvSpPr>
+        <p:spPr/>
+        <p:txBody>
+          <a:bodyPr/>
+          <a:lstStyle/>
+          <a:p>
+            <a:pPr>
+              <a:defRPr/>
+            </a:pPr>
+            <a:fld id="{C527DC3E-3A27-4D23-9336-3EAB36224A06}" type="slidenum">
+              <a:rPr lang="de-DE" smtClean="0"/>
+              <a:pPr>
+                <a:defRPr/>
+              </a:pPr>
               <a:t>4</a:t>
             </a:fld>
             <a:endParaRPr lang="de-DE"/>
@@ -10947,7 +10502,6 @@
               <a:rPr lang="de-DE" dirty="0"/>
               <a:t>| Einleitung | Aufgabenstellung | Systemmodell | GUI | Sonstiges</a:t>
             </a:r>
-            <a:endParaRPr lang="de-DE" dirty="0"/>
           </a:p>
         </p:txBody>
       </p:sp>
@@ -11111,7 +10665,6 @@
               <a:rPr lang="de-DE" dirty="0"/>
               <a:t>| GUI | Sonstiges</a:t>
             </a:r>
-            <a:endParaRPr lang="de-DE" dirty="0"/>
           </a:p>
         </p:txBody>
       </p:sp>
@@ -11185,7 +10738,12 @@
             <p:ph idx="1"/>
           </p:nvPr>
         </p:nvSpPr>
-        <p:spPr/>
+        <p:spPr>
+          <a:xfrm>
+            <a:off x="392113" y="1198562"/>
+            <a:ext cx="8356600" cy="5182765"/>
+          </a:xfrm>
+        </p:spPr>
         <p:txBody>
           <a:bodyPr/>
           <a:lstStyle/>
@@ -11255,7 +10813,6 @@
               <a:rPr lang="de-DE" dirty="0"/>
               <a:t>| GUI | Sonstiges</a:t>
             </a:r>
-            <a:endParaRPr lang="de-DE" dirty="0"/>
           </a:p>
         </p:txBody>
       </p:sp>
@@ -11453,6 +11010,35 @@
             <a:r>
               <a:rPr lang="de-DE" sz="3600" b="1" dirty="0" smtClean="0"/>
               <a:t>Statistiken</a:t>
+            </a:r>
+          </a:p>
+        </p:txBody>
+      </p:sp>
+      <p:sp>
+        <p:nvSpPr>
+          <p:cNvPr id="5" name="Textfeld 4"/>
+          <p:cNvSpPr txBox="1"/>
+          <p:nvPr/>
+        </p:nvSpPr>
+        <p:spPr>
+          <a:xfrm>
+            <a:off x="390525" y="6155135"/>
+            <a:ext cx="5902406" cy="215444"/>
+          </a:xfrm>
+          <a:prstGeom prst="rect">
+            <a:avLst/>
+          </a:prstGeom>
+          <a:noFill/>
+        </p:spPr>
+        <p:txBody>
+          <a:bodyPr wrap="square" rtlCol="0">
+            <a:spAutoFit/>
+          </a:bodyPr>
+          <a:lstStyle/>
+          <a:p>
+            <a:r>
+              <a:rPr lang="de-DE" sz="800" dirty="0"/>
+              <a:t>http://www.experto.de/b2b/marketing/online-marketing/web-2-0/ein-paar-interessante-fakten-rund-um-twitter.html</a:t>
             </a:r>
           </a:p>
         </p:txBody>
@@ -11761,7 +11347,6 @@
               <a:rPr lang="de-DE" dirty="0"/>
               <a:t> | Systemarchitektur | GUI | Sonstiges</a:t>
             </a:r>
-            <a:endParaRPr lang="de-DE" dirty="0"/>
           </a:p>
         </p:txBody>
       </p:sp>
@@ -12610,7 +12195,6 @@
               <a:rPr lang="de-DE" dirty="0"/>
               <a:t>| GUI | Sonstiges</a:t>
             </a:r>
-            <a:endParaRPr lang="de-DE" dirty="0"/>
           </a:p>
         </p:txBody>
       </p:sp>
@@ -13392,7 +12976,6 @@
               <a:rPr lang="de-DE" dirty="0"/>
               <a:t> | Sonstiges</a:t>
             </a:r>
-            <a:endParaRPr lang="de-DE" dirty="0"/>
           </a:p>
         </p:txBody>
       </p:sp>
@@ -14030,7 +13613,6 @@
               <a:rPr lang="de-DE" dirty="0"/>
               <a:t> | Sonstiges</a:t>
             </a:r>
-            <a:endParaRPr lang="de-DE" dirty="0"/>
           </a:p>
         </p:txBody>
       </p:sp>
@@ -14181,7 +13763,6 @@
               <a:rPr lang="de-DE" dirty="0"/>
               <a:t> | Sonstiges</a:t>
             </a:r>
-            <a:endParaRPr lang="de-DE" dirty="0"/>
           </a:p>
         </p:txBody>
       </p:sp>
@@ -14408,7 +13989,6 @@
               <a:rPr lang="de-DE" b="1" dirty="0"/>
               <a:t>Sonstiges</a:t>
             </a:r>
-            <a:endParaRPr lang="de-DE" b="1" dirty="0"/>
           </a:p>
         </p:txBody>
       </p:sp>

</xml_diff>